<commit_message>
Newer version of progress report
</commit_message>
<xml_diff>
--- a/electrical/Week 4 Jibebe presentation.pptx
+++ b/electrical/Week 4 Jibebe presentation.pptx
@@ -8,7 +8,7 @@
     <p:notesMasterId r:id="rId4"/>
   </p:notesMasterIdLst>
   <p:handoutMasterIdLst>
-    <p:handoutMasterId r:id="rId14"/>
+    <p:handoutMasterId r:id="rId15"/>
   </p:handoutMasterIdLst>
   <p:sldIdLst>
     <p:sldId id="256" r:id="rId3"/>
@@ -19,8 +19,9 @@
     <p:sldId id="270" r:id="rId9"/>
     <p:sldId id="265" r:id="rId10"/>
     <p:sldId id="267" r:id="rId11"/>
-    <p:sldId id="271" r:id="rId12"/>
-    <p:sldId id="285" r:id="rId13"/>
+    <p:sldId id="287" r:id="rId12"/>
+    <p:sldId id="271" r:id="rId13"/>
+    <p:sldId id="285" r:id="rId14"/>
   </p:sldIdLst>
   <p:sldSz cx="12192000" cy="6858000"/>
   <p:notesSz cx="6858000" cy="9144000"/>
@@ -1864,6 +1865,166 @@
 </file>
 
 <file path=ppt/slides/slide10.xml><?xml version="1.0" encoding="utf-8"?>
+<p:sld xmlns:a="http://schemas.openxmlformats.org/drawingml/2006/main" xmlns:r="http://schemas.openxmlformats.org/officeDocument/2006/relationships" xmlns:p="http://schemas.openxmlformats.org/presentationml/2006/main">
+  <p:cSld>
+    <p:spTree>
+      <p:nvGrpSpPr>
+        <p:cNvPr id="1" name=""/>
+        <p:cNvGrpSpPr/>
+        <p:nvPr/>
+      </p:nvGrpSpPr>
+      <p:grpSpPr/>
+      <p:pic>
+        <p:nvPicPr>
+          <p:cNvPr id="19457" name="图片 3"/>
+          <p:cNvPicPr>
+            <a:picLocks noChangeAspect="1"/>
+          </p:cNvPicPr>
+          <p:nvPr/>
+        </p:nvPicPr>
+        <p:blipFill>
+          <a:blip r:embed="rId1"/>
+          <a:srcRect l="5727" r="16841" b="26530"/>
+          <a:stretch>
+            <a:fillRect/>
+          </a:stretch>
+        </p:blipFill>
+        <p:spPr>
+          <a:xfrm>
+            <a:off x="0" y="0"/>
+            <a:ext cx="12192000" cy="6858000"/>
+          </a:xfrm>
+          <a:prstGeom prst="rect">
+            <a:avLst/>
+          </a:prstGeom>
+          <a:noFill/>
+          <a:ln w="9525">
+            <a:noFill/>
+          </a:ln>
+        </p:spPr>
+      </p:pic>
+      <p:sp>
+        <p:nvSpPr>
+          <p:cNvPr id="11274" name="文本框 28"/>
+          <p:cNvSpPr txBox="1"/>
+          <p:nvPr/>
+        </p:nvSpPr>
+        <p:spPr>
+          <a:xfrm>
+            <a:off x="926465" y="523875"/>
+            <a:ext cx="7409180" cy="706755"/>
+          </a:xfrm>
+          <a:prstGeom prst="rect">
+            <a:avLst/>
+          </a:prstGeom>
+          <a:noFill/>
+          <a:ln w="9525">
+            <a:noFill/>
+          </a:ln>
+        </p:spPr>
+        <p:txBody>
+          <a:bodyPr wrap="square" anchor="t">
+            <a:spAutoFit/>
+          </a:bodyPr>
+          <a:p>
+            <a:pPr>
+              <a:buFont typeface="Arial" panose="020B0604020202020204" pitchFamily="34" charset="0"/>
+            </a:pPr>
+            <a:r>
+              <a:rPr lang="en-US" altLang="zh-CN" sz="4000" b="1" dirty="0">
+                <a:solidFill>
+                  <a:srgbClr val="404040"/>
+                </a:solidFill>
+                <a:ea typeface="Calibri" panose="020F0502020204030204" pitchFamily="34" charset="0"/>
+              </a:rPr>
+              <a:t>CONCLUSION</a:t>
+            </a:r>
+            <a:endParaRPr lang="en-US" altLang="zh-CN" sz="4000" b="1" dirty="0">
+              <a:solidFill>
+                <a:srgbClr val="404040"/>
+              </a:solidFill>
+              <a:ea typeface="Calibri" panose="020F0502020204030204" pitchFamily="34" charset="0"/>
+            </a:endParaRPr>
+          </a:p>
+        </p:txBody>
+      </p:sp>
+      <p:sp>
+        <p:nvSpPr>
+          <p:cNvPr id="2" name="Text Box 1"/>
+          <p:cNvSpPr txBox="1"/>
+          <p:nvPr/>
+        </p:nvSpPr>
+        <p:spPr>
+          <a:xfrm>
+            <a:off x="589915" y="1633855"/>
+            <a:ext cx="10595610" cy="2676525"/>
+          </a:xfrm>
+          <a:prstGeom prst="rect">
+            <a:avLst/>
+          </a:prstGeom>
+          <a:noFill/>
+        </p:spPr>
+        <p:txBody>
+          <a:bodyPr wrap="square" rtlCol="0">
+            <a:spAutoFit/>
+          </a:bodyPr>
+          <a:p>
+            <a:r>
+              <a:rPr lang="en-US" sz="2400"/>
+              <a:t>Time is running out and we are a long way to go to complete the project. However , we have talked to Dr.Aoki and he has suggested we parallel follow these three options:</a:t>
+            </a:r>
+            <a:endParaRPr lang="en-US" sz="2400"/>
+          </a:p>
+          <a:p>
+            <a:endParaRPr lang="en-US" sz="2400"/>
+          </a:p>
+          <a:p>
+            <a:pPr marL="342900" indent="-342900">
+              <a:buFont typeface="Wingdings" panose="05000000000000000000" charset="0"/>
+              <a:buChar char="v"/>
+            </a:pPr>
+            <a:r>
+              <a:rPr lang="en-US" sz="2400"/>
+              <a:t>Purchase a compatible foot pedal throttle.</a:t>
+            </a:r>
+            <a:endParaRPr lang="en-US" sz="2400"/>
+          </a:p>
+          <a:p>
+            <a:pPr marL="342900" indent="-342900">
+              <a:buFont typeface="Wingdings" panose="05000000000000000000" charset="0"/>
+              <a:buChar char="v"/>
+            </a:pPr>
+            <a:r>
+              <a:rPr lang="en-US" sz="2400"/>
+              <a:t>Use local engineers to try and further troubleshoot the controller.</a:t>
+            </a:r>
+            <a:endParaRPr lang="en-US" sz="2400"/>
+          </a:p>
+          <a:p>
+            <a:pPr marL="342900" indent="-342900">
+              <a:buFont typeface="Wingdings" panose="05000000000000000000" charset="0"/>
+              <a:buChar char="v"/>
+            </a:pPr>
+            <a:r>
+              <a:rPr lang="en-US" sz="2400"/>
+              <a:t>Research &amp; see purchasing a popular, well-documented controller. </a:t>
+            </a:r>
+            <a:endParaRPr lang="en-US" sz="2400"/>
+          </a:p>
+        </p:txBody>
+      </p:sp>
+    </p:spTree>
+  </p:cSld>
+  <p:clrMapOvr>
+    <a:masterClrMapping/>
+  </p:clrMapOvr>
+  <p:transition spd="slow">
+    <p:wipe/>
+  </p:transition>
+</p:sld>
+</file>
+
+<file path=ppt/slides/slide11.xml><?xml version="1.0" encoding="utf-8"?>
 <p:sld xmlns:a="http://schemas.openxmlformats.org/drawingml/2006/main" xmlns:r="http://schemas.openxmlformats.org/officeDocument/2006/relationships" xmlns:p="http://schemas.openxmlformats.org/presentationml/2006/main">
   <p:cSld>
     <p:spTree>
@@ -3685,7 +3846,7 @@
       <p:grpSpPr/>
       <p:pic>
         <p:nvPicPr>
-          <p:cNvPr id="19457" name="图片 3"/>
+          <p:cNvPr id="14337" name="图片 3"/>
           <p:cNvPicPr>
             <a:picLocks noChangeAspect="1"/>
           </p:cNvPicPr>
@@ -3714,59 +3875,14 @@
       </p:pic>
       <p:sp>
         <p:nvSpPr>
-          <p:cNvPr id="11274" name="文本框 28"/>
-          <p:cNvSpPr txBox="1"/>
-          <p:nvPr/>
-        </p:nvSpPr>
-        <p:spPr>
-          <a:xfrm>
-            <a:off x="926465" y="523875"/>
-            <a:ext cx="7409180" cy="706755"/>
-          </a:xfrm>
-          <a:prstGeom prst="rect">
-            <a:avLst/>
-          </a:prstGeom>
-          <a:noFill/>
-          <a:ln w="9525">
-            <a:noFill/>
-          </a:ln>
-        </p:spPr>
-        <p:txBody>
-          <a:bodyPr wrap="square" anchor="t">
-            <a:spAutoFit/>
-          </a:bodyPr>
-          <a:p>
-            <a:pPr>
-              <a:buFont typeface="Arial" panose="020B0604020202020204" pitchFamily="34" charset="0"/>
-            </a:pPr>
-            <a:r>
-              <a:rPr lang="en-US" altLang="zh-CN" sz="4000" b="1" dirty="0">
-                <a:solidFill>
-                  <a:srgbClr val="404040"/>
-                </a:solidFill>
-                <a:ea typeface="Calibri" panose="020F0502020204030204" pitchFamily="34" charset="0"/>
-              </a:rPr>
-              <a:t>CONCLUSION</a:t>
-            </a:r>
-            <a:endParaRPr lang="en-US" altLang="zh-CN" sz="4000" b="1" dirty="0">
-              <a:solidFill>
-                <a:srgbClr val="404040"/>
-              </a:solidFill>
-              <a:ea typeface="Calibri" panose="020F0502020204030204" pitchFamily="34" charset="0"/>
-            </a:endParaRPr>
-          </a:p>
-        </p:txBody>
-      </p:sp>
-      <p:sp>
-        <p:nvSpPr>
           <p:cNvPr id="2" name="Text Box 1"/>
           <p:cNvSpPr txBox="1"/>
           <p:nvPr/>
         </p:nvSpPr>
         <p:spPr>
           <a:xfrm>
-            <a:off x="589915" y="1633855"/>
-            <a:ext cx="10595610" cy="2676525"/>
+            <a:off x="473710" y="501650"/>
+            <a:ext cx="10595610" cy="1568450"/>
           </a:xfrm>
           <a:prstGeom prst="rect">
             <a:avLst/>
@@ -3780,7 +3896,7 @@
           <a:p>
             <a:r>
               <a:rPr lang="en-US" sz="2400"/>
-              <a:t>Time is running out and we are a long way to go to complete the project. However , we have talked to Dr.Aoki and he has suggested we parallel follow these three options:</a:t>
+              <a:t>We have come across a few models of the buck converters and we are still looking for the best prices and suitability to come up with the bill of materials.</a:t>
             </a:r>
             <a:endParaRPr lang="en-US" sz="2400"/>
           </a:p>
@@ -3788,40 +3904,62 @@
             <a:endParaRPr lang="en-US" sz="2400"/>
           </a:p>
           <a:p>
-            <a:pPr marL="342900" indent="-342900">
-              <a:buFont typeface="Wingdings" panose="05000000000000000000" charset="0"/>
-              <a:buChar char="v"/>
-            </a:pPr>
             <a:r>
               <a:rPr lang="en-US" sz="2400"/>
-              <a:t>Purchase a compatible foot pedal throttle.</a:t>
+              <a:t>Here are some of them:</a:t>
             </a:r>
             <a:endParaRPr lang="en-US" sz="2400"/>
           </a:p>
-          <a:p>
-            <a:pPr marL="342900" indent="-342900">
-              <a:buFont typeface="Wingdings" panose="05000000000000000000" charset="0"/>
-              <a:buChar char="v"/>
-            </a:pPr>
-            <a:r>
-              <a:rPr lang="en-US" sz="2400"/>
-              <a:t>Use local engineers to try and further troubleshoot the controller.</a:t>
-            </a:r>
-            <a:endParaRPr lang="en-US" sz="2400"/>
-          </a:p>
-          <a:p>
-            <a:pPr marL="342900" indent="-342900">
-              <a:buFont typeface="Wingdings" panose="05000000000000000000" charset="0"/>
-              <a:buChar char="v"/>
-            </a:pPr>
-            <a:r>
-              <a:rPr lang="en-US" sz="2400"/>
-              <a:t>Research &amp; see purchasing a popular, well-documented controller. </a:t>
-            </a:r>
-            <a:endParaRPr lang="en-US" sz="2400"/>
-          </a:p>
-        </p:txBody>
-      </p:sp>
+        </p:txBody>
+      </p:sp>
+      <p:pic>
+        <p:nvPicPr>
+          <p:cNvPr id="4" name="Picture 3" descr="buck_1"/>
+          <p:cNvPicPr>
+            <a:picLocks noChangeAspect="1"/>
+          </p:cNvPicPr>
+          <p:nvPr/>
+        </p:nvPicPr>
+        <p:blipFill>
+          <a:blip r:embed="rId2"/>
+          <a:stretch>
+            <a:fillRect/>
+          </a:stretch>
+        </p:blipFill>
+        <p:spPr>
+          <a:xfrm>
+            <a:off x="473710" y="2235200"/>
+            <a:ext cx="3120390" cy="4452620"/>
+          </a:xfrm>
+          <a:prstGeom prst="rect">
+            <a:avLst/>
+          </a:prstGeom>
+        </p:spPr>
+      </p:pic>
+      <p:pic>
+        <p:nvPicPr>
+          <p:cNvPr id="5" name="Picture 4" descr="buck_2"/>
+          <p:cNvPicPr>
+            <a:picLocks noChangeAspect="1"/>
+          </p:cNvPicPr>
+          <p:nvPr/>
+        </p:nvPicPr>
+        <p:blipFill>
+          <a:blip r:embed="rId3"/>
+          <a:stretch>
+            <a:fillRect/>
+          </a:stretch>
+        </p:blipFill>
+        <p:spPr>
+          <a:xfrm>
+            <a:off x="3936365" y="2380615"/>
+            <a:ext cx="8124825" cy="3336925"/>
+          </a:xfrm>
+          <a:prstGeom prst="rect">
+            <a:avLst/>
+          </a:prstGeom>
+        </p:spPr>
+      </p:pic>
     </p:spTree>
   </p:cSld>
   <p:clrMapOvr>

</xml_diff>